<commit_message>
Added Updates for slides
</commit_message>
<xml_diff>
--- a/GettingStartedWithGithub.pptx
+++ b/GettingStartedWithGithub.pptx
@@ -5,7 +5,7 @@
     <p:sldMasterId id="2147483648" r:id="rId4"/>
   </p:sldMasterIdLst>
   <p:notesMasterIdLst>
-    <p:notesMasterId r:id="rId20"/>
+    <p:notesMasterId r:id="rId23"/>
   </p:notesMasterIdLst>
   <p:sldIdLst>
     <p:sldId id="256" r:id="rId5"/>
@@ -22,7 +22,10 @@
     <p:sldId id="258" r:id="rId16"/>
     <p:sldId id="259" r:id="rId17"/>
     <p:sldId id="260" r:id="rId18"/>
-    <p:sldId id="263" r:id="rId19"/>
+    <p:sldId id="274" r:id="rId19"/>
+    <p:sldId id="275" r:id="rId20"/>
+    <p:sldId id="276" r:id="rId21"/>
+    <p:sldId id="263" r:id="rId22"/>
   </p:sldIdLst>
   <p:sldSz cx="12192000" cy="6858000"/>
   <p:notesSz cx="6858000" cy="9144000"/>
@@ -6129,7 +6132,7 @@
           <a:p>
             <a:fld id="{12F9B0E6-B9BF-4E2D-AE08-8C7EBB196A2E}" type="datetimeFigureOut">
               <a:rPr lang="en-US" smtClean="0"/>
-              <a:t>3/6/2021</a:t>
+              <a:t>4/5/2021</a:t>
             </a:fld>
             <a:endParaRPr lang="en-US"/>
           </a:p>
@@ -6711,7 +6714,7 @@
           <a:p>
             <a:fld id="{3133F5E9-5DAC-4C4A-9DF5-C2B87276BCC8}" type="datetimeFigureOut">
               <a:rPr lang="en-US" smtClean="0"/>
-              <a:t>3/6/2021</a:t>
+              <a:t>4/5/2021</a:t>
             </a:fld>
             <a:endParaRPr lang="en-US" dirty="0"/>
           </a:p>
@@ -6909,7 +6912,7 @@
           <a:p>
             <a:fld id="{3133F5E9-5DAC-4C4A-9DF5-C2B87276BCC8}" type="datetimeFigureOut">
               <a:rPr lang="en-US" smtClean="0"/>
-              <a:t>3/6/2021</a:t>
+              <a:t>4/5/2021</a:t>
             </a:fld>
             <a:endParaRPr lang="en-US" dirty="0"/>
           </a:p>
@@ -7184,7 +7187,7 @@
           <a:p>
             <a:fld id="{3133F5E9-5DAC-4C4A-9DF5-C2B87276BCC8}" type="datetimeFigureOut">
               <a:rPr lang="en-US" smtClean="0"/>
-              <a:t>3/6/2021</a:t>
+              <a:t>4/5/2021</a:t>
             </a:fld>
             <a:endParaRPr lang="en-US" dirty="0"/>
           </a:p>
@@ -7449,7 +7452,7 @@
           <a:p>
             <a:fld id="{3133F5E9-5DAC-4C4A-9DF5-C2B87276BCC8}" type="datetimeFigureOut">
               <a:rPr lang="en-US" smtClean="0"/>
-              <a:t>3/6/2021</a:t>
+              <a:t>4/5/2021</a:t>
             </a:fld>
             <a:endParaRPr lang="en-US" dirty="0"/>
           </a:p>
@@ -7861,7 +7864,7 @@
           <a:p>
             <a:fld id="{3133F5E9-5DAC-4C4A-9DF5-C2B87276BCC8}" type="datetimeFigureOut">
               <a:rPr lang="en-US" smtClean="0"/>
-              <a:t>3/6/2021</a:t>
+              <a:t>4/5/2021</a:t>
             </a:fld>
             <a:endParaRPr lang="en-US" dirty="0"/>
           </a:p>
@@ -8002,7 +8005,7 @@
           <a:p>
             <a:fld id="{3133F5E9-5DAC-4C4A-9DF5-C2B87276BCC8}" type="datetimeFigureOut">
               <a:rPr lang="en-US" smtClean="0"/>
-              <a:t>3/6/2021</a:t>
+              <a:t>4/5/2021</a:t>
             </a:fld>
             <a:endParaRPr lang="en-US" dirty="0"/>
           </a:p>
@@ -8115,7 +8118,7 @@
           <a:p>
             <a:fld id="{3133F5E9-5DAC-4C4A-9DF5-C2B87276BCC8}" type="datetimeFigureOut">
               <a:rPr lang="en-US" smtClean="0"/>
-              <a:t>3/6/2021</a:t>
+              <a:t>4/5/2021</a:t>
             </a:fld>
             <a:endParaRPr lang="en-US" dirty="0"/>
           </a:p>
@@ -8426,7 +8429,7 @@
           <a:p>
             <a:fld id="{3133F5E9-5DAC-4C4A-9DF5-C2B87276BCC8}" type="datetimeFigureOut">
               <a:rPr lang="en-US" smtClean="0"/>
-              <a:t>3/6/2021</a:t>
+              <a:t>4/5/2021</a:t>
             </a:fld>
             <a:endParaRPr lang="en-US" dirty="0"/>
           </a:p>
@@ -8718,7 +8721,7 @@
           <a:p>
             <a:fld id="{3133F5E9-5DAC-4C4A-9DF5-C2B87276BCC8}" type="datetimeFigureOut">
               <a:rPr lang="en-US" smtClean="0"/>
-              <a:t>3/6/2021</a:t>
+              <a:t>4/5/2021</a:t>
             </a:fld>
             <a:endParaRPr lang="en-US" dirty="0"/>
           </a:p>
@@ -8959,7 +8962,7 @@
           <a:p>
             <a:fld id="{3133F5E9-5DAC-4C4A-9DF5-C2B87276BCC8}" type="datetimeFigureOut">
               <a:rPr lang="en-US" smtClean="0"/>
-              <a:t>3/6/2021</a:t>
+              <a:t>4/5/2021</a:t>
             </a:fld>
             <a:endParaRPr lang="en-US" dirty="0"/>
           </a:p>
@@ -10765,46 +10768,6 @@
       </p:sp>
       <p:sp>
         <p:nvSpPr>
-          <p:cNvPr id="13" name="TextBox 12">
-            <a:extLst>
-              <a:ext uri="{FF2B5EF4-FFF2-40B4-BE49-F238E27FC236}">
-                <a16:creationId xmlns:a16="http://schemas.microsoft.com/office/drawing/2014/main" id="{7200DCA9-3B7A-4837-9C64-F0CE0D5E2B3A}"/>
-              </a:ext>
-            </a:extLst>
-          </p:cNvPr>
-          <p:cNvSpPr txBox="1"/>
-          <p:nvPr/>
-        </p:nvSpPr>
-        <p:spPr>
-          <a:xfrm>
-            <a:off x="663286" y="3784291"/>
-            <a:ext cx="1984663" cy="338554"/>
-          </a:xfrm>
-          <a:prstGeom prst="rect">
-            <a:avLst/>
-          </a:prstGeom>
-          <a:noFill/>
-        </p:spPr>
-        <p:txBody>
-          <a:bodyPr wrap="square" rtlCol="0">
-            <a:spAutoFit/>
-          </a:bodyPr>
-          <a:lstStyle/>
-          <a:p>
-            <a:pPr algn="ctr"/>
-            <a:r>
-              <a:rPr lang="en-US" sz="1600" dirty="0">
-                <a:latin typeface="Tahoma" panose="020B0604030504040204" pitchFamily="34" charset="0"/>
-                <a:ea typeface="Tahoma" panose="020B0604030504040204" pitchFamily="34" charset="0"/>
-                <a:cs typeface="Tahoma" panose="020B0604030504040204" pitchFamily="34" charset="0"/>
-              </a:rPr>
-              <a:t>Enter label here</a:t>
-            </a:r>
-          </a:p>
-        </p:txBody>
-      </p:sp>
-      <p:sp>
-        <p:nvSpPr>
           <p:cNvPr id="15" name="Rectangle: Rounded Corners 14">
             <a:extLst>
               <a:ext uri="{FF2B5EF4-FFF2-40B4-BE49-F238E27FC236}">
@@ -10866,46 +10829,6 @@
       </p:sp>
       <p:sp>
         <p:nvSpPr>
-          <p:cNvPr id="17" name="TextBox 16">
-            <a:extLst>
-              <a:ext uri="{FF2B5EF4-FFF2-40B4-BE49-F238E27FC236}">
-                <a16:creationId xmlns:a16="http://schemas.microsoft.com/office/drawing/2014/main" id="{57D4552E-64C5-40E0-AE15-5B00BB70508E}"/>
-              </a:ext>
-            </a:extLst>
-          </p:cNvPr>
-          <p:cNvSpPr txBox="1"/>
-          <p:nvPr/>
-        </p:nvSpPr>
-        <p:spPr>
-          <a:xfrm>
-            <a:off x="663286" y="6376554"/>
-            <a:ext cx="1984663" cy="338554"/>
-          </a:xfrm>
-          <a:prstGeom prst="rect">
-            <a:avLst/>
-          </a:prstGeom>
-          <a:noFill/>
-        </p:spPr>
-        <p:txBody>
-          <a:bodyPr wrap="square" rtlCol="0">
-            <a:spAutoFit/>
-          </a:bodyPr>
-          <a:lstStyle/>
-          <a:p>
-            <a:pPr algn="ctr"/>
-            <a:r>
-              <a:rPr lang="en-US" sz="1600" dirty="0">
-                <a:latin typeface="Tahoma" panose="020B0604030504040204" pitchFamily="34" charset="0"/>
-                <a:ea typeface="Tahoma" panose="020B0604030504040204" pitchFamily="34" charset="0"/>
-                <a:cs typeface="Tahoma" panose="020B0604030504040204" pitchFamily="34" charset="0"/>
-              </a:rPr>
-              <a:t>Enter label here</a:t>
-            </a:r>
-          </a:p>
-        </p:txBody>
-      </p:sp>
-      <p:sp>
-        <p:nvSpPr>
           <p:cNvPr id="18" name="Rectangle: Rounded Corners 17">
             <a:extLst>
               <a:ext uri="{FF2B5EF4-FFF2-40B4-BE49-F238E27FC236}">
@@ -10966,46 +10889,6 @@
             <a:r>
               <a:rPr lang="en-US" dirty="0"/>
               <a:t> </a:t>
-            </a:r>
-          </a:p>
-        </p:txBody>
-      </p:sp>
-      <p:sp>
-        <p:nvSpPr>
-          <p:cNvPr id="20" name="TextBox 19">
-            <a:extLst>
-              <a:ext uri="{FF2B5EF4-FFF2-40B4-BE49-F238E27FC236}">
-                <a16:creationId xmlns:a16="http://schemas.microsoft.com/office/drawing/2014/main" id="{F1B674D5-C064-4DDD-8FE9-D8801F4C0A04}"/>
-              </a:ext>
-            </a:extLst>
-          </p:cNvPr>
-          <p:cNvSpPr txBox="1"/>
-          <p:nvPr/>
-        </p:nvSpPr>
-        <p:spPr>
-          <a:xfrm>
-            <a:off x="3614305" y="3784291"/>
-            <a:ext cx="1984663" cy="338554"/>
-          </a:xfrm>
-          <a:prstGeom prst="rect">
-            <a:avLst/>
-          </a:prstGeom>
-          <a:noFill/>
-        </p:spPr>
-        <p:txBody>
-          <a:bodyPr wrap="square" rtlCol="0">
-            <a:spAutoFit/>
-          </a:bodyPr>
-          <a:lstStyle/>
-          <a:p>
-            <a:pPr algn="ctr"/>
-            <a:r>
-              <a:rPr lang="en-US" sz="1600" dirty="0">
-                <a:latin typeface="Tahoma" panose="020B0604030504040204" pitchFamily="34" charset="0"/>
-                <a:ea typeface="Tahoma" panose="020B0604030504040204" pitchFamily="34" charset="0"/>
-                <a:cs typeface="Tahoma" panose="020B0604030504040204" pitchFamily="34" charset="0"/>
-              </a:rPr>
-              <a:t>Enter label here</a:t>
             </a:r>
           </a:p>
         </p:txBody>
@@ -11080,46 +10963,6 @@
       </p:sp>
       <p:sp>
         <p:nvSpPr>
-          <p:cNvPr id="23" name="TextBox 22">
-            <a:extLst>
-              <a:ext uri="{FF2B5EF4-FFF2-40B4-BE49-F238E27FC236}">
-                <a16:creationId xmlns:a16="http://schemas.microsoft.com/office/drawing/2014/main" id="{1D0FFF75-43A7-4E33-BD4E-2A24EA207112}"/>
-              </a:ext>
-            </a:extLst>
-          </p:cNvPr>
-          <p:cNvSpPr txBox="1"/>
-          <p:nvPr/>
-        </p:nvSpPr>
-        <p:spPr>
-          <a:xfrm>
-            <a:off x="3614305" y="6376554"/>
-            <a:ext cx="1984663" cy="338554"/>
-          </a:xfrm>
-          <a:prstGeom prst="rect">
-            <a:avLst/>
-          </a:prstGeom>
-          <a:noFill/>
-        </p:spPr>
-        <p:txBody>
-          <a:bodyPr wrap="square" rtlCol="0">
-            <a:spAutoFit/>
-          </a:bodyPr>
-          <a:lstStyle/>
-          <a:p>
-            <a:pPr algn="ctr"/>
-            <a:r>
-              <a:rPr lang="en-US" sz="1600" dirty="0">
-                <a:latin typeface="Tahoma" panose="020B0604030504040204" pitchFamily="34" charset="0"/>
-                <a:ea typeface="Tahoma" panose="020B0604030504040204" pitchFamily="34" charset="0"/>
-                <a:cs typeface="Tahoma" panose="020B0604030504040204" pitchFamily="34" charset="0"/>
-              </a:rPr>
-              <a:t>Enter label here</a:t>
-            </a:r>
-          </a:p>
-        </p:txBody>
-      </p:sp>
-      <p:sp>
-        <p:nvSpPr>
           <p:cNvPr id="19" name="Rectangle: Rounded Corners 18">
             <a:extLst>
               <a:ext uri="{FF2B5EF4-FFF2-40B4-BE49-F238E27FC236}">
@@ -11178,46 +11021,6 @@
       </p:sp>
       <p:sp>
         <p:nvSpPr>
-          <p:cNvPr id="21" name="TextBox 20">
-            <a:extLst>
-              <a:ext uri="{FF2B5EF4-FFF2-40B4-BE49-F238E27FC236}">
-                <a16:creationId xmlns:a16="http://schemas.microsoft.com/office/drawing/2014/main" id="{CAA0715F-CA2B-4594-91FD-D8C6E5E10965}"/>
-              </a:ext>
-            </a:extLst>
-          </p:cNvPr>
-          <p:cNvSpPr txBox="1"/>
-          <p:nvPr/>
-        </p:nvSpPr>
-        <p:spPr>
-          <a:xfrm>
-            <a:off x="6565863" y="3810842"/>
-            <a:ext cx="1984663" cy="338554"/>
-          </a:xfrm>
-          <a:prstGeom prst="rect">
-            <a:avLst/>
-          </a:prstGeom>
-          <a:noFill/>
-        </p:spPr>
-        <p:txBody>
-          <a:bodyPr wrap="square" rtlCol="0">
-            <a:spAutoFit/>
-          </a:bodyPr>
-          <a:lstStyle/>
-          <a:p>
-            <a:pPr algn="ctr"/>
-            <a:r>
-              <a:rPr lang="en-US" sz="1600" dirty="0">
-                <a:latin typeface="Tahoma" panose="020B0604030504040204" pitchFamily="34" charset="0"/>
-                <a:ea typeface="Tahoma" panose="020B0604030504040204" pitchFamily="34" charset="0"/>
-                <a:cs typeface="Tahoma" panose="020B0604030504040204" pitchFamily="34" charset="0"/>
-              </a:rPr>
-              <a:t>Enter label here</a:t>
-            </a:r>
-          </a:p>
-        </p:txBody>
-      </p:sp>
-      <p:sp>
-        <p:nvSpPr>
           <p:cNvPr id="24" name="Rectangle: Rounded Corners 23">
             <a:extLst>
               <a:ext uri="{FF2B5EF4-FFF2-40B4-BE49-F238E27FC236}">
@@ -11273,46 +11076,6 @@
             <a:r>
               <a:rPr lang="en-US" dirty="0"/>
               <a:t>git push –u origin main </a:t>
-            </a:r>
-          </a:p>
-        </p:txBody>
-      </p:sp>
-      <p:sp>
-        <p:nvSpPr>
-          <p:cNvPr id="25" name="TextBox 24">
-            <a:extLst>
-              <a:ext uri="{FF2B5EF4-FFF2-40B4-BE49-F238E27FC236}">
-                <a16:creationId xmlns:a16="http://schemas.microsoft.com/office/drawing/2014/main" id="{036E47C2-C29C-4EC4-A9A9-B75D7A68E935}"/>
-              </a:ext>
-            </a:extLst>
-          </p:cNvPr>
-          <p:cNvSpPr txBox="1"/>
-          <p:nvPr/>
-        </p:nvSpPr>
-        <p:spPr>
-          <a:xfrm>
-            <a:off x="6556664" y="6376554"/>
-            <a:ext cx="1984663" cy="338554"/>
-          </a:xfrm>
-          <a:prstGeom prst="rect">
-            <a:avLst/>
-          </a:prstGeom>
-          <a:noFill/>
-        </p:spPr>
-        <p:txBody>
-          <a:bodyPr wrap="square" rtlCol="0">
-            <a:spAutoFit/>
-          </a:bodyPr>
-          <a:lstStyle/>
-          <a:p>
-            <a:pPr algn="ctr"/>
-            <a:r>
-              <a:rPr lang="en-US" sz="1600" dirty="0">
-                <a:latin typeface="Tahoma" panose="020B0604030504040204" pitchFamily="34" charset="0"/>
-                <a:ea typeface="Tahoma" panose="020B0604030504040204" pitchFamily="34" charset="0"/>
-                <a:cs typeface="Tahoma" panose="020B0604030504040204" pitchFamily="34" charset="0"/>
-              </a:rPr>
-              <a:t>Enter label here</a:t>
             </a:r>
           </a:p>
         </p:txBody>
@@ -12921,6 +12684,371 @@
 </file>
 
 <file path=ppt/slides/slide15.xml><?xml version="1.0" encoding="utf-8"?>
+<p:sld xmlns:a="http://schemas.openxmlformats.org/drawingml/2006/main" xmlns:r="http://schemas.openxmlformats.org/officeDocument/2006/relationships" xmlns:p="http://schemas.openxmlformats.org/presentationml/2006/main">
+  <p:cSld>
+    <p:spTree>
+      <p:nvGrpSpPr>
+        <p:cNvPr id="1" name=""/>
+        <p:cNvGrpSpPr/>
+        <p:nvPr/>
+      </p:nvGrpSpPr>
+      <p:grpSpPr>
+        <a:xfrm>
+          <a:off x="0" y="0"/>
+          <a:ext cx="0" cy="0"/>
+          <a:chOff x="0" y="0"/>
+          <a:chExt cx="0" cy="0"/>
+        </a:xfrm>
+      </p:grpSpPr>
+      <p:sp>
+        <p:nvSpPr>
+          <p:cNvPr id="2" name="Title 1">
+            <a:extLst>
+              <a:ext uri="{FF2B5EF4-FFF2-40B4-BE49-F238E27FC236}">
+                <a16:creationId xmlns:a16="http://schemas.microsoft.com/office/drawing/2014/main" id="{6C649C7C-E03A-4AEB-88B2-783D22048F9F}"/>
+              </a:ext>
+            </a:extLst>
+          </p:cNvPr>
+          <p:cNvSpPr>
+            <a:spLocks noGrp="1"/>
+          </p:cNvSpPr>
+          <p:nvPr>
+            <p:ph type="title"/>
+          </p:nvPr>
+        </p:nvSpPr>
+        <p:spPr>
+          <a:xfrm>
+            <a:off x="838200" y="871152"/>
+            <a:ext cx="10515600" cy="4384428"/>
+          </a:xfrm>
+        </p:spPr>
+        <p:txBody>
+          <a:bodyPr>
+            <a:normAutofit/>
+          </a:bodyPr>
+          <a:lstStyle/>
+          <a:p>
+            <a:pPr algn="ctr"/>
+            <a:r>
+              <a:rPr lang="es-MX" sz="23900" b="1" dirty="0" err="1">
+                <a:solidFill>
+                  <a:schemeClr val="accent1">
+                    <a:lumMod val="50000"/>
+                  </a:schemeClr>
+                </a:solidFill>
+              </a:rPr>
+              <a:t>Part</a:t>
+            </a:r>
+            <a:r>
+              <a:rPr lang="es-MX" sz="23900" b="1" dirty="0">
+                <a:solidFill>
+                  <a:schemeClr val="accent1">
+                    <a:lumMod val="50000"/>
+                  </a:schemeClr>
+                </a:solidFill>
+              </a:rPr>
+              <a:t> 2</a:t>
+            </a:r>
+          </a:p>
+        </p:txBody>
+      </p:sp>
+    </p:spTree>
+    <p:extLst>
+      <p:ext uri="{BB962C8B-B14F-4D97-AF65-F5344CB8AC3E}">
+        <p14:creationId xmlns:p14="http://schemas.microsoft.com/office/powerpoint/2010/main" val="4079476591"/>
+      </p:ext>
+    </p:extLst>
+  </p:cSld>
+  <p:clrMapOvr>
+    <a:masterClrMapping/>
+  </p:clrMapOvr>
+</p:sld>
+</file>
+
+<file path=ppt/slides/slide16.xml><?xml version="1.0" encoding="utf-8"?>
+<p:sld xmlns:a="http://schemas.openxmlformats.org/drawingml/2006/main" xmlns:r="http://schemas.openxmlformats.org/officeDocument/2006/relationships" xmlns:p="http://schemas.openxmlformats.org/presentationml/2006/main">
+  <p:cSld>
+    <p:spTree>
+      <p:nvGrpSpPr>
+        <p:cNvPr id="1" name=""/>
+        <p:cNvGrpSpPr/>
+        <p:nvPr/>
+      </p:nvGrpSpPr>
+      <p:grpSpPr>
+        <a:xfrm>
+          <a:off x="0" y="0"/>
+          <a:ext cx="0" cy="0"/>
+          <a:chOff x="0" y="0"/>
+          <a:chExt cx="0" cy="0"/>
+        </a:xfrm>
+      </p:grpSpPr>
+      <p:sp>
+        <p:nvSpPr>
+          <p:cNvPr id="2" name="Title 1">
+            <a:extLst>
+              <a:ext uri="{FF2B5EF4-FFF2-40B4-BE49-F238E27FC236}">
+                <a16:creationId xmlns:a16="http://schemas.microsoft.com/office/drawing/2014/main" id="{A094EEE6-4D04-4AF6-B6DA-15CCF8E3F8E0}"/>
+              </a:ext>
+            </a:extLst>
+          </p:cNvPr>
+          <p:cNvSpPr>
+            <a:spLocks noGrp="1"/>
+          </p:cNvSpPr>
+          <p:nvPr>
+            <p:ph type="title"/>
+          </p:nvPr>
+        </p:nvSpPr>
+        <p:spPr/>
+        <p:txBody>
+          <a:bodyPr/>
+          <a:lstStyle/>
+          <a:p>
+            <a:pPr algn="ctr"/>
+            <a:r>
+              <a:rPr lang="es-MX" dirty="0" err="1"/>
+              <a:t>Merge</a:t>
+            </a:r>
+            <a:endParaRPr lang="es-MX" dirty="0"/>
+          </a:p>
+        </p:txBody>
+      </p:sp>
+      <p:pic>
+        <p:nvPicPr>
+          <p:cNvPr id="6" name="Picture 5">
+            <a:extLst>
+              <a:ext uri="{FF2B5EF4-FFF2-40B4-BE49-F238E27FC236}">
+                <a16:creationId xmlns:a16="http://schemas.microsoft.com/office/drawing/2014/main" id="{199EA15E-9093-4959-99B6-66AD1D4DC4B4}"/>
+              </a:ext>
+            </a:extLst>
+          </p:cNvPr>
+          <p:cNvPicPr>
+            <a:picLocks noChangeAspect="1"/>
+          </p:cNvPicPr>
+          <p:nvPr/>
+        </p:nvPicPr>
+        <p:blipFill rotWithShape="1">
+          <a:blip r:embed="rId2"/>
+          <a:srcRect l="12104" r="10576"/>
+          <a:stretch/>
+        </p:blipFill>
+        <p:spPr>
+          <a:xfrm>
+            <a:off x="1114425" y="2302645"/>
+            <a:ext cx="4286250" cy="3733800"/>
+          </a:xfrm>
+          <a:prstGeom prst="rect">
+            <a:avLst/>
+          </a:prstGeom>
+        </p:spPr>
+      </p:pic>
+      <p:pic>
+        <p:nvPicPr>
+          <p:cNvPr id="8" name="Picture 7">
+            <a:extLst>
+              <a:ext uri="{FF2B5EF4-FFF2-40B4-BE49-F238E27FC236}">
+                <a16:creationId xmlns:a16="http://schemas.microsoft.com/office/drawing/2014/main" id="{7B22B2FA-DF7D-49F2-9C15-CC14C54A844F}"/>
+              </a:ext>
+            </a:extLst>
+          </p:cNvPr>
+          <p:cNvPicPr>
+            <a:picLocks noChangeAspect="1"/>
+          </p:cNvPicPr>
+          <p:nvPr/>
+        </p:nvPicPr>
+        <p:blipFill rotWithShape="1">
+          <a:blip r:embed="rId3"/>
+          <a:srcRect l="14730" r="22200"/>
+          <a:stretch/>
+        </p:blipFill>
+        <p:spPr>
+          <a:xfrm>
+            <a:off x="8286749" y="1950220"/>
+            <a:ext cx="1447801" cy="4591050"/>
+          </a:xfrm>
+          <a:prstGeom prst="rect">
+            <a:avLst/>
+          </a:prstGeom>
+        </p:spPr>
+      </p:pic>
+      <p:sp>
+        <p:nvSpPr>
+          <p:cNvPr id="9" name="Arrow: Right 8">
+            <a:extLst>
+              <a:ext uri="{FF2B5EF4-FFF2-40B4-BE49-F238E27FC236}">
+                <a16:creationId xmlns:a16="http://schemas.microsoft.com/office/drawing/2014/main" id="{689F7796-70F2-4917-BD65-AE142025C1C2}"/>
+              </a:ext>
+            </a:extLst>
+          </p:cNvPr>
+          <p:cNvSpPr/>
+          <p:nvPr/>
+        </p:nvSpPr>
+        <p:spPr>
+          <a:xfrm>
+            <a:off x="5962650" y="3990975"/>
+            <a:ext cx="1847850" cy="254770"/>
+          </a:xfrm>
+          <a:prstGeom prst="rightArrow">
+            <a:avLst/>
+          </a:prstGeom>
+        </p:spPr>
+        <p:style>
+          <a:lnRef idx="2">
+            <a:schemeClr val="accent1">
+              <a:shade val="50000"/>
+            </a:schemeClr>
+          </a:lnRef>
+          <a:fillRef idx="1">
+            <a:schemeClr val="accent1"/>
+          </a:fillRef>
+          <a:effectRef idx="0">
+            <a:schemeClr val="accent1"/>
+          </a:effectRef>
+          <a:fontRef idx="minor">
+            <a:schemeClr val="lt1"/>
+          </a:fontRef>
+        </p:style>
+        <p:txBody>
+          <a:bodyPr rtlCol="0" anchor="ctr"/>
+          <a:lstStyle/>
+          <a:p>
+            <a:pPr algn="ctr"/>
+            <a:endParaRPr lang="es-MX"/>
+          </a:p>
+        </p:txBody>
+      </p:sp>
+    </p:spTree>
+    <p:extLst>
+      <p:ext uri="{BB962C8B-B14F-4D97-AF65-F5344CB8AC3E}">
+        <p14:creationId xmlns:p14="http://schemas.microsoft.com/office/powerpoint/2010/main" val="2543548092"/>
+      </p:ext>
+    </p:extLst>
+  </p:cSld>
+  <p:clrMapOvr>
+    <a:masterClrMapping/>
+  </p:clrMapOvr>
+</p:sld>
+</file>
+
+<file path=ppt/slides/slide17.xml><?xml version="1.0" encoding="utf-8"?>
+<p:sld xmlns:a="http://schemas.openxmlformats.org/drawingml/2006/main" xmlns:r="http://schemas.openxmlformats.org/officeDocument/2006/relationships" xmlns:p="http://schemas.openxmlformats.org/presentationml/2006/main">
+  <p:cSld>
+    <p:spTree>
+      <p:nvGrpSpPr>
+        <p:cNvPr id="1" name=""/>
+        <p:cNvGrpSpPr/>
+        <p:nvPr/>
+      </p:nvGrpSpPr>
+      <p:grpSpPr>
+        <a:xfrm>
+          <a:off x="0" y="0"/>
+          <a:ext cx="0" cy="0"/>
+          <a:chOff x="0" y="0"/>
+          <a:chExt cx="0" cy="0"/>
+        </a:xfrm>
+      </p:grpSpPr>
+      <p:sp>
+        <p:nvSpPr>
+          <p:cNvPr id="2" name="Title 1">
+            <a:extLst>
+              <a:ext uri="{FF2B5EF4-FFF2-40B4-BE49-F238E27FC236}">
+                <a16:creationId xmlns:a16="http://schemas.microsoft.com/office/drawing/2014/main" id="{8A0968BE-DAAE-468A-8E26-36FB9B12DC68}"/>
+              </a:ext>
+            </a:extLst>
+          </p:cNvPr>
+          <p:cNvSpPr>
+            <a:spLocks noGrp="1"/>
+          </p:cNvSpPr>
+          <p:nvPr>
+            <p:ph type="title"/>
+          </p:nvPr>
+        </p:nvSpPr>
+        <p:spPr/>
+        <p:txBody>
+          <a:bodyPr/>
+          <a:lstStyle/>
+          <a:p>
+            <a:r>
+              <a:rPr lang="es-MX" dirty="0" err="1"/>
+              <a:t>Codgios</a:t>
+            </a:r>
+            <a:r>
+              <a:rPr lang="es-MX" dirty="0"/>
+              <a:t> necesarios </a:t>
+            </a:r>
+          </a:p>
+        </p:txBody>
+      </p:sp>
+      <p:sp>
+        <p:nvSpPr>
+          <p:cNvPr id="3" name="Content Placeholder 2">
+            <a:extLst>
+              <a:ext uri="{FF2B5EF4-FFF2-40B4-BE49-F238E27FC236}">
+                <a16:creationId xmlns:a16="http://schemas.microsoft.com/office/drawing/2014/main" id="{580922BF-DCCE-4ACA-A672-9EA0B0FBB7CC}"/>
+              </a:ext>
+            </a:extLst>
+          </p:cNvPr>
+          <p:cNvSpPr>
+            <a:spLocks noGrp="1"/>
+          </p:cNvSpPr>
+          <p:nvPr>
+            <p:ph idx="1"/>
+          </p:nvPr>
+        </p:nvSpPr>
+        <p:spPr/>
+        <p:txBody>
+          <a:bodyPr/>
+          <a:lstStyle/>
+          <a:p>
+            <a:r>
+              <a:rPr lang="en-US" dirty="0"/>
+              <a:t>git branch --list           # See list of current branches</a:t>
+            </a:r>
+          </a:p>
+          <a:p>
+            <a:r>
+              <a:rPr lang="en-US" dirty="0"/>
+              <a:t>git branch [name]       # Create Branch</a:t>
+            </a:r>
+          </a:p>
+          <a:p>
+            <a:r>
+              <a:rPr lang="en-US" dirty="0"/>
+              <a:t>git checkout [name]   </a:t>
+            </a:r>
+            <a:r>
+              <a:rPr lang="en-US"/>
+              <a:t># Switch </a:t>
+            </a:r>
+            <a:r>
+              <a:rPr lang="en-US" dirty="0"/>
+              <a:t>to branch</a:t>
+            </a:r>
+          </a:p>
+          <a:p>
+            <a:r>
+              <a:rPr lang="en-US" dirty="0"/>
+              <a:t>git push --set-upstream origin  [name of branch] # Push to branch</a:t>
+            </a:r>
+          </a:p>
+          <a:p>
+            <a:endParaRPr lang="es-MX" dirty="0"/>
+          </a:p>
+        </p:txBody>
+      </p:sp>
+    </p:spTree>
+    <p:extLst>
+      <p:ext uri="{BB962C8B-B14F-4D97-AF65-F5344CB8AC3E}">
+        <p14:creationId xmlns:p14="http://schemas.microsoft.com/office/powerpoint/2010/main" val="2937309659"/>
+      </p:ext>
+    </p:extLst>
+  </p:cSld>
+  <p:clrMapOvr>
+    <a:masterClrMapping/>
+  </p:clrMapOvr>
+</p:sld>
+</file>
+
+<file path=ppt/slides/slide18.xml><?xml version="1.0" encoding="utf-8"?>
 <p:sld xmlns:a="http://schemas.openxmlformats.org/drawingml/2006/main" xmlns:r="http://schemas.openxmlformats.org/officeDocument/2006/relationships" xmlns:p="http://schemas.openxmlformats.org/presentationml/2006/main">
   <p:cSld>
     <p:bg>
@@ -17279,14 +17407,6 @@
 </file>
 
 <file path=customXml/item2.xml><?xml version="1.0" encoding="utf-8"?>
-<p:properties xmlns:p="http://schemas.microsoft.com/office/2006/metadata/properties" xmlns:xsi="http://www.w3.org/2001/XMLSchema-instance" xmlns:pc="http://schemas.microsoft.com/office/infopath/2007/PartnerControls">
-  <documentManagement>
-    <MediaServiceKeyPoints xmlns="71af3243-3dd4-4a8d-8c0d-dd76da1f02a5" xsi:nil="true"/>
-  </documentManagement>
-</p:properties>
-</file>
-
-<file path=customXml/item3.xml><?xml version="1.0" encoding="utf-8"?>
 <ct:contentTypeSchema xmlns:ct="http://schemas.microsoft.com/office/2006/metadata/contentType" xmlns:ma="http://schemas.microsoft.com/office/2006/metadata/properties/metaAttributes" ct:_="" ma:_="" ma:contentTypeName="Document" ma:contentTypeID="0x01010079F111ED35F8CC479449609E8A0923A6" ma:contentTypeVersion="11" ma:contentTypeDescription="Create a new document." ma:contentTypeScope="" ma:versionID="96291512c1ee715ab617f4c07df79fc1">
   <xsd:schema xmlns:xsd="http://www.w3.org/2001/XMLSchema" xmlns:xs="http://www.w3.org/2001/XMLSchema" xmlns:p="http://schemas.microsoft.com/office/2006/metadata/properties" xmlns:ns2="71af3243-3dd4-4a8d-8c0d-dd76da1f02a5" xmlns:ns3="16c05727-aa75-4e4a-9b5f-8a80a1165891" targetNamespace="http://schemas.microsoft.com/office/2006/metadata/properties" ma:root="true" ma:fieldsID="8256c27c40ca5c40ce1cf6c44f0205df" ns2:_="" ns3:_="">
     <xsd:import namespace="71af3243-3dd4-4a8d-8c0d-dd76da1f02a5"/>
@@ -17497,6 +17617,14 @@
 </ct:contentTypeSchema>
 </file>
 
+<file path=customXml/item3.xml><?xml version="1.0" encoding="utf-8"?>
+<p:properties xmlns:p="http://schemas.microsoft.com/office/2006/metadata/properties" xmlns:xsi="http://www.w3.org/2001/XMLSchema-instance" xmlns:pc="http://schemas.microsoft.com/office/infopath/2007/PartnerControls">
+  <documentManagement>
+    <MediaServiceKeyPoints xmlns="71af3243-3dd4-4a8d-8c0d-dd76da1f02a5" xsi:nil="true"/>
+  </documentManagement>
+</p:properties>
+</file>
+
 <file path=customXml/itemProps1.xml><?xml version="1.0" encoding="utf-8"?>
 <ds:datastoreItem xmlns:ds="http://schemas.openxmlformats.org/officeDocument/2006/customXml" ds:itemID="{604BA817-A03C-4EA3-86C4-6E42BD37F523}">
   <ds:schemaRefs>
@@ -17506,16 +17634,6 @@
 </file>
 
 <file path=customXml/itemProps2.xml><?xml version="1.0" encoding="utf-8"?>
-<ds:datastoreItem xmlns:ds="http://schemas.openxmlformats.org/officeDocument/2006/customXml" ds:itemID="{D0096A91-93C8-4C7A-BF68-944591874A6D}">
-  <ds:schemaRefs>
-    <ds:schemaRef ds:uri="http://schemas.microsoft.com/office/2006/metadata/properties"/>
-    <ds:schemaRef ds:uri="http://schemas.microsoft.com/office/infopath/2007/PartnerControls"/>
-    <ds:schemaRef ds:uri="71af3243-3dd4-4a8d-8c0d-dd76da1f02a5"/>
-  </ds:schemaRefs>
-</ds:datastoreItem>
-</file>
-
-<file path=customXml/itemProps3.xml><?xml version="1.0" encoding="utf-8"?>
 <ds:datastoreItem xmlns:ds="http://schemas.openxmlformats.org/officeDocument/2006/customXml" ds:itemID="{19E59094-1E6F-42D5-A62B-D0344AFFFACC}">
   <ds:schemaRefs>
     <ds:schemaRef ds:uri="http://schemas.microsoft.com/office/2006/metadata/contentType"/>
@@ -17532,4 +17650,14 @@
     <ds:schemaRef ds:uri="http://schemas.microsoft.com/internal/obd"/>
   </ds:schemaRefs>
 </ds:datastoreItem>
+</file>
+
+<file path=customXml/itemProps3.xml><?xml version="1.0" encoding="utf-8"?>
+<ds:datastoreItem xmlns:ds="http://schemas.openxmlformats.org/officeDocument/2006/customXml" ds:itemID="{D0096A91-93C8-4C7A-BF68-944591874A6D}">
+  <ds:schemaRefs>
+    <ds:schemaRef ds:uri="http://schemas.microsoft.com/office/2006/metadata/properties"/>
+    <ds:schemaRef ds:uri="http://schemas.microsoft.com/office/infopath/2007/PartnerControls"/>
+    <ds:schemaRef ds:uri="71af3243-3dd4-4a8d-8c0d-dd76da1f02a5"/>
+  </ds:schemaRefs>
+</ds:datastoreItem>
 </file>
</xml_diff>